<commit_message>
Higher resolution graphics and proof reading comments
</commit_message>
<xml_diff>
--- a/weatherBalloon2/Block-Diagrams of MSA.pptx
+++ b/weatherBalloon2/Block-Diagrams of MSA.pptx
@@ -8,7 +8,7 @@
     <p:sldId id="262" r:id="rId2"/>
     <p:sldId id="263" r:id="rId3"/>
   </p:sldIdLst>
-  <p:sldSz cx="9144000" cy="6858000" type="screen4x3"/>
+  <p:sldSz cx="6858000" cy="9906000" type="A4"/>
   <p:notesSz cx="6858000" cy="9144000"/>
   <p:defaultTextStyle>
     <a:defPPr>
@@ -137,8 +137,8 @@
         </p:nvSpPr>
         <p:spPr>
           <a:xfrm>
-            <a:off x="685800" y="2130425"/>
-            <a:ext cx="7772400" cy="1470025"/>
+            <a:off x="514350" y="3077282"/>
+            <a:ext cx="5829300" cy="2123369"/>
           </a:xfrm>
         </p:spPr>
         <p:txBody>
@@ -165,8 +165,8 @@
         </p:nvSpPr>
         <p:spPr>
           <a:xfrm>
-            <a:off x="1371600" y="3886200"/>
-            <a:ext cx="6400800" cy="1752600"/>
+            <a:off x="1028700" y="5613400"/>
+            <a:ext cx="4800600" cy="2531533"/>
           </a:xfrm>
         </p:spPr>
         <p:txBody>
@@ -290,7 +290,7 @@
             <a:fld id="{C6116FA5-319C-47D3-9403-4DE7B338B268}" type="datetimeFigureOut">
               <a:rPr lang="en-US" smtClean="0"/>
               <a:pPr/>
-              <a:t>5/12/2014</a:t>
+              <a:t>6/4/14</a:t>
             </a:fld>
             <a:endParaRPr lang="en-US"/>
           </a:p>
@@ -457,7 +457,7 @@
             <a:fld id="{C6116FA5-319C-47D3-9403-4DE7B338B268}" type="datetimeFigureOut">
               <a:rPr lang="en-US" smtClean="0"/>
               <a:pPr/>
-              <a:t>5/12/2014</a:t>
+              <a:t>6/4/14</a:t>
             </a:fld>
             <a:endParaRPr lang="en-US"/>
           </a:p>
@@ -543,8 +543,8 @@
         </p:nvSpPr>
         <p:spPr>
           <a:xfrm>
-            <a:off x="6629400" y="274638"/>
-            <a:ext cx="2057400" cy="5851525"/>
+            <a:off x="4972050" y="396700"/>
+            <a:ext cx="1543050" cy="8452203"/>
           </a:xfrm>
         </p:spPr>
         <p:txBody>
@@ -571,8 +571,8 @@
         </p:nvSpPr>
         <p:spPr>
           <a:xfrm>
-            <a:off x="457200" y="274638"/>
-            <a:ext cx="6019800" cy="5851525"/>
+            <a:off x="342900" y="396700"/>
+            <a:ext cx="4514850" cy="8452203"/>
           </a:xfrm>
         </p:spPr>
         <p:txBody>
@@ -634,7 +634,7 @@
             <a:fld id="{C6116FA5-319C-47D3-9403-4DE7B338B268}" type="datetimeFigureOut">
               <a:rPr lang="en-US" smtClean="0"/>
               <a:pPr/>
-              <a:t>5/12/2014</a:t>
+              <a:t>6/4/14</a:t>
             </a:fld>
             <a:endParaRPr lang="en-US"/>
           </a:p>
@@ -801,7 +801,7 @@
             <a:fld id="{C6116FA5-319C-47D3-9403-4DE7B338B268}" type="datetimeFigureOut">
               <a:rPr lang="en-US" smtClean="0"/>
               <a:pPr/>
-              <a:t>5/12/2014</a:t>
+              <a:t>6/4/14</a:t>
             </a:fld>
             <a:endParaRPr lang="en-US"/>
           </a:p>
@@ -887,8 +887,8 @@
         </p:nvSpPr>
         <p:spPr>
           <a:xfrm>
-            <a:off x="722313" y="4406900"/>
-            <a:ext cx="7772400" cy="1362075"/>
+            <a:off x="541735" y="6365523"/>
+            <a:ext cx="5829300" cy="1967442"/>
           </a:xfrm>
         </p:spPr>
         <p:txBody>
@@ -919,8 +919,8 @@
         </p:nvSpPr>
         <p:spPr>
           <a:xfrm>
-            <a:off x="722313" y="2906713"/>
-            <a:ext cx="7772400" cy="1500187"/>
+            <a:off x="541735" y="4198586"/>
+            <a:ext cx="5829300" cy="2166937"/>
           </a:xfrm>
         </p:spPr>
         <p:txBody>
@@ -1044,7 +1044,7 @@
             <a:fld id="{C6116FA5-319C-47D3-9403-4DE7B338B268}" type="datetimeFigureOut">
               <a:rPr lang="en-US" smtClean="0"/>
               <a:pPr/>
-              <a:t>5/12/2014</a:t>
+              <a:t>6/4/14</a:t>
             </a:fld>
             <a:endParaRPr lang="en-US"/>
           </a:p>
@@ -1153,8 +1153,8 @@
         </p:nvSpPr>
         <p:spPr>
           <a:xfrm>
-            <a:off x="457200" y="1600200"/>
-            <a:ext cx="4038600" cy="4525963"/>
+            <a:off x="342900" y="2311401"/>
+            <a:ext cx="3028950" cy="6537502"/>
           </a:xfrm>
         </p:spPr>
         <p:txBody>
@@ -1238,8 +1238,8 @@
         </p:nvSpPr>
         <p:spPr>
           <a:xfrm>
-            <a:off x="4648200" y="1600200"/>
-            <a:ext cx="4038600" cy="4525963"/>
+            <a:off x="3486150" y="2311401"/>
+            <a:ext cx="3028950" cy="6537502"/>
           </a:xfrm>
         </p:spPr>
         <p:txBody>
@@ -1329,7 +1329,7 @@
             <a:fld id="{C6116FA5-319C-47D3-9403-4DE7B338B268}" type="datetimeFigureOut">
               <a:rPr lang="en-US" smtClean="0"/>
               <a:pPr/>
-              <a:t>5/12/2014</a:t>
+              <a:t>6/4/14</a:t>
             </a:fld>
             <a:endParaRPr lang="en-US"/>
           </a:p>
@@ -1442,8 +1442,8 @@
         </p:nvSpPr>
         <p:spPr>
           <a:xfrm>
-            <a:off x="457200" y="1535113"/>
-            <a:ext cx="4040188" cy="639762"/>
+            <a:off x="342900" y="2217385"/>
+            <a:ext cx="3030141" cy="924101"/>
           </a:xfrm>
         </p:spPr>
         <p:txBody>
@@ -1507,8 +1507,8 @@
         </p:nvSpPr>
         <p:spPr>
           <a:xfrm>
-            <a:off x="457200" y="2174875"/>
-            <a:ext cx="4040188" cy="3951288"/>
+            <a:off x="342900" y="3141486"/>
+            <a:ext cx="3030141" cy="5707416"/>
           </a:xfrm>
         </p:spPr>
         <p:txBody>
@@ -1592,8 +1592,8 @@
         </p:nvSpPr>
         <p:spPr>
           <a:xfrm>
-            <a:off x="4645025" y="1535113"/>
-            <a:ext cx="4041775" cy="639762"/>
+            <a:off x="3483769" y="2217385"/>
+            <a:ext cx="3031331" cy="924101"/>
           </a:xfrm>
         </p:spPr>
         <p:txBody>
@@ -1657,8 +1657,8 @@
         </p:nvSpPr>
         <p:spPr>
           <a:xfrm>
-            <a:off x="4645025" y="2174875"/>
-            <a:ext cx="4041775" cy="3951288"/>
+            <a:off x="3483769" y="3141486"/>
+            <a:ext cx="3031331" cy="5707416"/>
           </a:xfrm>
         </p:spPr>
         <p:txBody>
@@ -1748,7 +1748,7 @@
             <a:fld id="{C6116FA5-319C-47D3-9403-4DE7B338B268}" type="datetimeFigureOut">
               <a:rPr lang="en-US" smtClean="0"/>
               <a:pPr/>
-              <a:t>5/12/2014</a:t>
+              <a:t>6/4/14</a:t>
             </a:fld>
             <a:endParaRPr lang="en-US"/>
           </a:p>
@@ -1863,7 +1863,7 @@
             <a:fld id="{C6116FA5-319C-47D3-9403-4DE7B338B268}" type="datetimeFigureOut">
               <a:rPr lang="en-US" smtClean="0"/>
               <a:pPr/>
-              <a:t>5/12/2014</a:t>
+              <a:t>6/4/14</a:t>
             </a:fld>
             <a:endParaRPr lang="en-US"/>
           </a:p>
@@ -1955,7 +1955,7 @@
             <a:fld id="{C6116FA5-319C-47D3-9403-4DE7B338B268}" type="datetimeFigureOut">
               <a:rPr lang="en-US" smtClean="0"/>
               <a:pPr/>
-              <a:t>5/12/2014</a:t>
+              <a:t>6/4/14</a:t>
             </a:fld>
             <a:endParaRPr lang="en-US"/>
           </a:p>
@@ -2041,8 +2041,8 @@
         </p:nvSpPr>
         <p:spPr>
           <a:xfrm>
-            <a:off x="457200" y="273050"/>
-            <a:ext cx="3008313" cy="1162050"/>
+            <a:off x="342900" y="394405"/>
+            <a:ext cx="2256235" cy="1678517"/>
           </a:xfrm>
         </p:spPr>
         <p:txBody>
@@ -2073,8 +2073,8 @@
         </p:nvSpPr>
         <p:spPr>
           <a:xfrm>
-            <a:off x="3575050" y="273050"/>
-            <a:ext cx="5111750" cy="5853113"/>
+            <a:off x="2681287" y="394406"/>
+            <a:ext cx="3833813" cy="8454497"/>
           </a:xfrm>
         </p:spPr>
         <p:txBody>
@@ -2158,8 +2158,8 @@
         </p:nvSpPr>
         <p:spPr>
           <a:xfrm>
-            <a:off x="457200" y="1435100"/>
-            <a:ext cx="3008313" cy="4691063"/>
+            <a:off x="342900" y="2072923"/>
+            <a:ext cx="2256235" cy="6775980"/>
           </a:xfrm>
         </p:spPr>
         <p:txBody>
@@ -2229,7 +2229,7 @@
             <a:fld id="{C6116FA5-319C-47D3-9403-4DE7B338B268}" type="datetimeFigureOut">
               <a:rPr lang="en-US" smtClean="0"/>
               <a:pPr/>
-              <a:t>5/12/2014</a:t>
+              <a:t>6/4/14</a:t>
             </a:fld>
             <a:endParaRPr lang="en-US"/>
           </a:p>
@@ -2315,8 +2315,8 @@
         </p:nvSpPr>
         <p:spPr>
           <a:xfrm>
-            <a:off x="1792288" y="4800600"/>
-            <a:ext cx="5486400" cy="566738"/>
+            <a:off x="1344216" y="6934200"/>
+            <a:ext cx="4114800" cy="818622"/>
           </a:xfrm>
         </p:spPr>
         <p:txBody>
@@ -2347,8 +2347,8 @@
         </p:nvSpPr>
         <p:spPr>
           <a:xfrm>
-            <a:off x="1792288" y="612775"/>
-            <a:ext cx="5486400" cy="4114800"/>
+            <a:off x="1344216" y="885119"/>
+            <a:ext cx="4114800" cy="5943600"/>
           </a:xfrm>
         </p:spPr>
         <p:txBody>
@@ -2408,8 +2408,8 @@
         </p:nvSpPr>
         <p:spPr>
           <a:xfrm>
-            <a:off x="1792288" y="5367338"/>
-            <a:ext cx="5486400" cy="804862"/>
+            <a:off x="1344216" y="7752822"/>
+            <a:ext cx="4114800" cy="1162578"/>
           </a:xfrm>
         </p:spPr>
         <p:txBody>
@@ -2479,7 +2479,7 @@
             <a:fld id="{C6116FA5-319C-47D3-9403-4DE7B338B268}" type="datetimeFigureOut">
               <a:rPr lang="en-US" smtClean="0"/>
               <a:pPr/>
-              <a:t>5/12/2014</a:t>
+              <a:t>6/4/14</a:t>
             </a:fld>
             <a:endParaRPr lang="en-US"/>
           </a:p>
@@ -2570,8 +2570,8 @@
         </p:nvSpPr>
         <p:spPr>
           <a:xfrm>
-            <a:off x="457200" y="274638"/>
-            <a:ext cx="8229600" cy="1143000"/>
+            <a:off x="342900" y="396699"/>
+            <a:ext cx="6172200" cy="1651000"/>
           </a:xfrm>
           <a:prstGeom prst="rect">
             <a:avLst/>
@@ -2603,8 +2603,8 @@
         </p:nvSpPr>
         <p:spPr>
           <a:xfrm>
-            <a:off x="457200" y="1600200"/>
-            <a:ext cx="8229600" cy="4525963"/>
+            <a:off x="342900" y="2311401"/>
+            <a:ext cx="6172200" cy="6537502"/>
           </a:xfrm>
           <a:prstGeom prst="rect">
             <a:avLst/>
@@ -2665,8 +2665,8 @@
         </p:nvSpPr>
         <p:spPr>
           <a:xfrm>
-            <a:off x="457200" y="6356350"/>
-            <a:ext cx="2133600" cy="365125"/>
+            <a:off x="342900" y="9181395"/>
+            <a:ext cx="1600200" cy="527403"/>
           </a:xfrm>
           <a:prstGeom prst="rect">
             <a:avLst/>
@@ -2689,7 +2689,7 @@
             <a:fld id="{C6116FA5-319C-47D3-9403-4DE7B338B268}" type="datetimeFigureOut">
               <a:rPr lang="en-US" smtClean="0"/>
               <a:pPr/>
-              <a:t>5/12/2014</a:t>
+              <a:t>6/4/14</a:t>
             </a:fld>
             <a:endParaRPr lang="en-US"/>
           </a:p>
@@ -2707,8 +2707,8 @@
         </p:nvSpPr>
         <p:spPr>
           <a:xfrm>
-            <a:off x="3124200" y="6356350"/>
-            <a:ext cx="2895600" cy="365125"/>
+            <a:off x="2343150" y="9181395"/>
+            <a:ext cx="2171700" cy="527403"/>
           </a:xfrm>
           <a:prstGeom prst="rect">
             <a:avLst/>
@@ -2744,8 +2744,8 @@
         </p:nvSpPr>
         <p:spPr>
           <a:xfrm>
-            <a:off x="6553200" y="6356350"/>
-            <a:ext cx="2133600" cy="365125"/>
+            <a:off x="4914900" y="9181395"/>
+            <a:ext cx="1600200" cy="527403"/>
           </a:xfrm>
           <a:prstGeom prst="rect">
             <a:avLst/>
@@ -3068,8 +3068,8 @@
         </p:nvSpPr>
         <p:spPr>
           <a:xfrm>
-            <a:off x="3352800" y="914400"/>
-            <a:ext cx="2590800" cy="533400"/>
+            <a:off x="2514600" y="1320800"/>
+            <a:ext cx="1943100" cy="770467"/>
           </a:xfrm>
           <a:prstGeom prst="rect">
             <a:avLst/>
@@ -3130,8 +3130,8 @@
         </p:nvSpPr>
         <p:spPr>
           <a:xfrm>
-            <a:off x="3352800" y="4572000"/>
-            <a:ext cx="2590800" cy="533400"/>
+            <a:off x="2514600" y="6934200"/>
+            <a:ext cx="1943100" cy="770467"/>
           </a:xfrm>
           <a:prstGeom prst="rect">
             <a:avLst/>
@@ -3193,8 +3193,8 @@
         </p:nvCxnSpPr>
         <p:spPr>
           <a:xfrm>
-            <a:off x="4648200" y="1447800"/>
-            <a:ext cx="0" cy="381000"/>
+            <a:off x="3486150" y="2091267"/>
+            <a:ext cx="0" cy="550333"/>
           </a:xfrm>
           <a:prstGeom prst="straightConnector1">
             <a:avLst/>
@@ -3233,8 +3233,8 @@
         </p:nvCxnSpPr>
         <p:spPr>
           <a:xfrm flipV="1">
-            <a:off x="4648200" y="4191000"/>
-            <a:ext cx="0" cy="381000"/>
+            <a:off x="3486150" y="6383867"/>
+            <a:ext cx="0" cy="550333"/>
           </a:xfrm>
           <a:prstGeom prst="straightConnector1">
             <a:avLst/>
@@ -3270,8 +3270,8 @@
         </p:nvSpPr>
         <p:spPr>
           <a:xfrm>
-            <a:off x="5943599" y="2116723"/>
-            <a:ext cx="1055077" cy="200055"/>
+            <a:off x="4695093" y="2836281"/>
+            <a:ext cx="791308" cy="400110"/>
           </a:xfrm>
           <a:prstGeom prst="rect">
             <a:avLst/>
@@ -3285,14 +3285,14 @@
           <a:lstStyle/>
           <a:p>
             <a:r>
-              <a:rPr lang="en-US" sz="700" b="1" dirty="0" smtClean="0">
+              <a:rPr lang="en-US" sz="1000" b="1" dirty="0" smtClean="0">
                 <a:latin typeface="FreeSans" pitchFamily="34" charset="0"/>
                 <a:ea typeface="FreeSans" pitchFamily="34" charset="0"/>
                 <a:cs typeface="FreeSans" pitchFamily="34" charset="0"/>
               </a:rPr>
               <a:t>Pin Not Pulled</a:t>
             </a:r>
-            <a:endParaRPr lang="en-US" sz="700" b="1" dirty="0">
+            <a:endParaRPr lang="en-US" sz="1000" b="1" dirty="0">
               <a:latin typeface="FreeSans" pitchFamily="34" charset="0"/>
               <a:ea typeface="FreeSans" pitchFamily="34" charset="0"/>
               <a:cs typeface="FreeSans" pitchFamily="34" charset="0"/>
@@ -3308,8 +3308,8 @@
         </p:nvSpPr>
         <p:spPr>
           <a:xfrm>
-            <a:off x="3352800" y="2743200"/>
-            <a:ext cx="2590800" cy="533400"/>
+            <a:off x="2514600" y="3962400"/>
+            <a:ext cx="1943100" cy="1100667"/>
           </a:xfrm>
           <a:prstGeom prst="rect">
             <a:avLst/>
@@ -3383,8 +3383,8 @@
         </p:nvCxnSpPr>
         <p:spPr>
           <a:xfrm flipV="1">
-            <a:off x="4648200" y="2362200"/>
-            <a:ext cx="0" cy="381000"/>
+            <a:off x="3486150" y="3412067"/>
+            <a:ext cx="0" cy="550333"/>
           </a:xfrm>
           <a:prstGeom prst="straightConnector1">
             <a:avLst/>
@@ -3420,8 +3420,8 @@
         </p:nvSpPr>
         <p:spPr>
           <a:xfrm>
-            <a:off x="3352800" y="3657600"/>
-            <a:ext cx="2590800" cy="533400"/>
+            <a:off x="2514600" y="5613400"/>
+            <a:ext cx="1943100" cy="770467"/>
           </a:xfrm>
           <a:prstGeom prst="rect">
             <a:avLst/>
@@ -3480,8 +3480,8 @@
         </p:nvSpPr>
         <p:spPr>
           <a:xfrm>
-            <a:off x="3352800" y="1828800"/>
-            <a:ext cx="2590800" cy="533400"/>
+            <a:off x="2514600" y="2641600"/>
+            <a:ext cx="1943100" cy="770467"/>
           </a:xfrm>
           <a:prstGeom prst="rect">
             <a:avLst/>
@@ -3551,8 +3551,8 @@
         </p:nvSpPr>
         <p:spPr>
           <a:xfrm>
-            <a:off x="3810000" y="2438400"/>
-            <a:ext cx="743578" cy="200055"/>
+            <a:off x="2514600" y="3522134"/>
+            <a:ext cx="900584" cy="246221"/>
           </a:xfrm>
           <a:prstGeom prst="rect">
             <a:avLst/>
@@ -3565,15 +3565,16 @@
           </a:bodyPr>
           <a:lstStyle/>
           <a:p>
-            <a:r>
-              <a:rPr lang="en-US" sz="700" b="1" dirty="0" smtClean="0">
+            <a:pPr algn="r"/>
+            <a:r>
+              <a:rPr lang="en-US" sz="1000" b="1" dirty="0" smtClean="0">
                 <a:latin typeface="FreeSans" pitchFamily="34" charset="0"/>
                 <a:ea typeface="FreeSans" pitchFamily="34" charset="0"/>
                 <a:cs typeface="FreeSans" pitchFamily="34" charset="0"/>
               </a:rPr>
               <a:t>Pin Pulled</a:t>
             </a:r>
-            <a:endParaRPr lang="en-US" sz="700" b="1" dirty="0">
+            <a:endParaRPr lang="en-US" sz="1000" b="1" dirty="0">
               <a:latin typeface="FreeSans" pitchFamily="34" charset="0"/>
               <a:ea typeface="FreeSans" pitchFamily="34" charset="0"/>
               <a:cs typeface="FreeSans" pitchFamily="34" charset="0"/>
@@ -3592,8 +3593,8 @@
         </p:nvCxnSpPr>
         <p:spPr>
           <a:xfrm flipV="1">
-            <a:off x="4648200" y="3276600"/>
-            <a:ext cx="0" cy="381000"/>
+            <a:off x="3486150" y="5063067"/>
+            <a:ext cx="0" cy="550333"/>
           </a:xfrm>
           <a:prstGeom prst="straightConnector1">
             <a:avLst/>
@@ -3632,8 +3633,8 @@
         </p:nvCxnSpPr>
         <p:spPr>
           <a:xfrm flipH="1" flipV="1">
-            <a:off x="4648200" y="1828800"/>
-            <a:ext cx="1295400" cy="266700"/>
+            <a:off x="3486150" y="2641600"/>
+            <a:ext cx="971550" cy="385233"/>
           </a:xfrm>
           <a:prstGeom prst="bentConnector4">
             <a:avLst>
@@ -3674,13 +3675,13 @@
         </p:nvCxnSpPr>
         <p:spPr>
           <a:xfrm flipH="1" flipV="1">
-            <a:off x="4648200" y="2743200"/>
-            <a:ext cx="1295400" cy="266700"/>
+            <a:off x="3486150" y="3962400"/>
+            <a:ext cx="971550" cy="550333"/>
           </a:xfrm>
           <a:prstGeom prst="bentConnector4">
             <a:avLst>
               <a:gd name="adj1" fmla="val -17647"/>
-              <a:gd name="adj2" fmla="val 185714"/>
+              <a:gd name="adj2" fmla="val 160000"/>
             </a:avLst>
           </a:prstGeom>
           <a:ln w="25400">
@@ -3713,8 +3714,8 @@
         </p:nvSpPr>
         <p:spPr>
           <a:xfrm>
-            <a:off x="5943600" y="3048000"/>
-            <a:ext cx="1371600" cy="415498"/>
+            <a:off x="4686300" y="3708215"/>
+            <a:ext cx="1028700" cy="1323439"/>
           </a:xfrm>
           <a:prstGeom prst="rect">
             <a:avLst/>
@@ -3728,7 +3729,7 @@
           <a:lstStyle/>
           <a:p>
             <a:r>
-              <a:rPr lang="en-US" sz="700" b="1" dirty="0" smtClean="0">
+              <a:rPr lang="en-US" sz="1000" b="1" dirty="0" smtClean="0">
                 <a:latin typeface="FreeSans" pitchFamily="34" charset="0"/>
                 <a:ea typeface="FreeSans" pitchFamily="34" charset="0"/>
                 <a:cs typeface="FreeSans" pitchFamily="34" charset="0"/>
@@ -3738,7 +3739,7 @@
           </a:p>
           <a:p>
             <a:r>
-              <a:rPr lang="en-US" sz="700" b="1" dirty="0" smtClean="0">
+              <a:rPr lang="en-US" sz="1000" b="1" dirty="0" smtClean="0">
                 <a:latin typeface="FreeSans" pitchFamily="34" charset="0"/>
                 <a:ea typeface="FreeSans" pitchFamily="34" charset="0"/>
                 <a:cs typeface="FreeSans" pitchFamily="34" charset="0"/>
@@ -3748,14 +3749,14 @@
           </a:p>
           <a:p>
             <a:r>
-              <a:rPr lang="en-US" sz="700" b="1" dirty="0" smtClean="0">
+              <a:rPr lang="en-US" sz="1000" b="1" dirty="0" smtClean="0">
                 <a:latin typeface="FreeSans" pitchFamily="34" charset="0"/>
                 <a:ea typeface="FreeSans" pitchFamily="34" charset="0"/>
                 <a:cs typeface="FreeSans" pitchFamily="34" charset="0"/>
               </a:rPr>
               <a:t>Battery Voltage Acceptable</a:t>
             </a:r>
-            <a:endParaRPr lang="en-US" sz="700" b="1" dirty="0">
+            <a:endParaRPr lang="en-US" sz="1000" b="1" dirty="0">
               <a:latin typeface="FreeSans" pitchFamily="34" charset="0"/>
               <a:ea typeface="FreeSans" pitchFamily="34" charset="0"/>
               <a:cs typeface="FreeSans" pitchFamily="34" charset="0"/>
@@ -3771,8 +3772,8 @@
         </p:nvSpPr>
         <p:spPr>
           <a:xfrm>
-            <a:off x="4648199" y="3276600"/>
-            <a:ext cx="1055077" cy="200055"/>
+            <a:off x="3486149" y="5104299"/>
+            <a:ext cx="1314451" cy="400110"/>
           </a:xfrm>
           <a:prstGeom prst="rect">
             <a:avLst/>
@@ -3786,14 +3787,14 @@
           <a:lstStyle/>
           <a:p>
             <a:r>
-              <a:rPr lang="en-US" sz="700" b="1" dirty="0" smtClean="0">
+              <a:rPr lang="en-US" sz="1000" b="1" dirty="0" smtClean="0">
                 <a:latin typeface="FreeSans" pitchFamily="34" charset="0"/>
                 <a:ea typeface="FreeSans" pitchFamily="34" charset="0"/>
                 <a:cs typeface="FreeSans" pitchFamily="34" charset="0"/>
               </a:rPr>
               <a:t>Shutdown Triggered</a:t>
             </a:r>
-            <a:endParaRPr lang="en-US" sz="700" b="1" dirty="0">
+            <a:endParaRPr lang="en-US" sz="1000" b="1" dirty="0">
               <a:latin typeface="FreeSans" pitchFamily="34" charset="0"/>
               <a:ea typeface="FreeSans" pitchFamily="34" charset="0"/>
               <a:cs typeface="FreeSans" pitchFamily="34" charset="0"/>
@@ -3811,9 +3812,9 @@
           <p:nvPr/>
         </p:nvCxnSpPr>
         <p:spPr>
-          <a:xfrm flipH="1">
-            <a:off x="3048000" y="3009900"/>
-            <a:ext cx="304800" cy="0"/>
+          <a:xfrm flipH="1" flipV="1">
+            <a:off x="2171700" y="4495223"/>
+            <a:ext cx="342900" cy="17511"/>
           </a:xfrm>
           <a:prstGeom prst="straightConnector1">
             <a:avLst/>
@@ -3849,8 +3850,8 @@
         </p:nvSpPr>
         <p:spPr>
           <a:xfrm>
-            <a:off x="2057400" y="2743200"/>
-            <a:ext cx="990600" cy="533400"/>
+            <a:off x="1428750" y="4182533"/>
+            <a:ext cx="742950" cy="625378"/>
           </a:xfrm>
           <a:prstGeom prst="rect">
             <a:avLst/>
@@ -3928,8 +3929,8 @@
         </p:nvSpPr>
         <p:spPr>
           <a:xfrm>
-            <a:off x="4724400" y="1752600"/>
-            <a:ext cx="2590800" cy="533400"/>
+            <a:off x="3543300" y="2531533"/>
+            <a:ext cx="1943100" cy="770467"/>
           </a:xfrm>
           <a:prstGeom prst="rect">
             <a:avLst/>
@@ -3990,8 +3991,8 @@
         </p:nvSpPr>
         <p:spPr>
           <a:xfrm>
-            <a:off x="4724400" y="4495800"/>
-            <a:ext cx="2590800" cy="533400"/>
+            <a:off x="3543300" y="6493933"/>
+            <a:ext cx="1943100" cy="770467"/>
           </a:xfrm>
           <a:prstGeom prst="rect">
             <a:avLst/>
@@ -4053,8 +4054,8 @@
         </p:nvCxnSpPr>
         <p:spPr>
           <a:xfrm>
-            <a:off x="6019800" y="2286000"/>
-            <a:ext cx="0" cy="381000"/>
+            <a:off x="4514850" y="3302000"/>
+            <a:ext cx="0" cy="550333"/>
           </a:xfrm>
           <a:prstGeom prst="straightConnector1">
             <a:avLst/>
@@ -4093,8 +4094,8 @@
         </p:nvCxnSpPr>
         <p:spPr>
           <a:xfrm flipV="1">
-            <a:off x="2819400" y="2286000"/>
-            <a:ext cx="0" cy="381000"/>
+            <a:off x="2114550" y="3302000"/>
+            <a:ext cx="0" cy="550333"/>
           </a:xfrm>
           <a:prstGeom prst="straightConnector1">
             <a:avLst/>
@@ -4130,8 +4131,8 @@
         </p:nvSpPr>
         <p:spPr>
           <a:xfrm>
-            <a:off x="4724400" y="3581400"/>
-            <a:ext cx="2590800" cy="533400"/>
+            <a:off x="3543300" y="5173133"/>
+            <a:ext cx="1943100" cy="770467"/>
           </a:xfrm>
           <a:prstGeom prst="rect">
             <a:avLst/>
@@ -4194,8 +4195,8 @@
         </p:nvCxnSpPr>
         <p:spPr>
           <a:xfrm flipV="1">
-            <a:off x="6019800" y="3200400"/>
-            <a:ext cx="0" cy="381000"/>
+            <a:off x="4514850" y="4622800"/>
+            <a:ext cx="0" cy="550333"/>
           </a:xfrm>
           <a:prstGeom prst="straightConnector1">
             <a:avLst/>
@@ -4231,8 +4232,8 @@
         </p:nvSpPr>
         <p:spPr>
           <a:xfrm>
-            <a:off x="4724400" y="2667000"/>
-            <a:ext cx="2590800" cy="533400"/>
+            <a:off x="3543300" y="3852333"/>
+            <a:ext cx="1943100" cy="770467"/>
           </a:xfrm>
           <a:prstGeom prst="rect">
             <a:avLst/>
@@ -4293,8 +4294,8 @@
         </p:nvCxnSpPr>
         <p:spPr>
           <a:xfrm flipV="1">
-            <a:off x="6019800" y="4114800"/>
-            <a:ext cx="0" cy="381000"/>
+            <a:off x="4514850" y="5943600"/>
+            <a:ext cx="0" cy="550333"/>
           </a:xfrm>
           <a:prstGeom prst="straightConnector1">
             <a:avLst/>
@@ -4333,8 +4334,8 @@
         </p:nvCxnSpPr>
         <p:spPr>
           <a:xfrm flipH="1" flipV="1">
-            <a:off x="2819400" y="1752600"/>
-            <a:ext cx="1295400" cy="2095500"/>
+            <a:off x="2114550" y="2531534"/>
+            <a:ext cx="971550" cy="3026833"/>
           </a:xfrm>
           <a:prstGeom prst="bentConnector4">
             <a:avLst>
@@ -4375,8 +4376,8 @@
         </p:nvCxnSpPr>
         <p:spPr>
           <a:xfrm flipH="1" flipV="1">
-            <a:off x="6019800" y="1752600"/>
-            <a:ext cx="1295400" cy="3924300"/>
+            <a:off x="4514850" y="2531534"/>
+            <a:ext cx="971550" cy="5668433"/>
           </a:xfrm>
           <a:prstGeom prst="bentConnector4">
             <a:avLst>
@@ -4414,8 +4415,8 @@
         </p:nvSpPr>
         <p:spPr>
           <a:xfrm>
-            <a:off x="1447800" y="838200"/>
-            <a:ext cx="2895600" cy="533400"/>
+            <a:off x="1085850" y="1210733"/>
+            <a:ext cx="2171700" cy="770467"/>
           </a:xfrm>
           <a:prstGeom prst="rect">
             <a:avLst/>
@@ -4468,8 +4469,8 @@
         </p:nvSpPr>
         <p:spPr>
           <a:xfrm>
-            <a:off x="1524000" y="1752600"/>
-            <a:ext cx="2590800" cy="533400"/>
+            <a:off x="1143000" y="2531533"/>
+            <a:ext cx="1943100" cy="770467"/>
           </a:xfrm>
           <a:prstGeom prst="rect">
             <a:avLst/>
@@ -4528,8 +4529,8 @@
         </p:nvSpPr>
         <p:spPr>
           <a:xfrm>
-            <a:off x="1524000" y="2667000"/>
-            <a:ext cx="2590800" cy="533400"/>
+            <a:off x="1143000" y="3852333"/>
+            <a:ext cx="1943100" cy="770467"/>
           </a:xfrm>
           <a:prstGeom prst="rect">
             <a:avLst/>
@@ -4606,8 +4607,8 @@
         </p:nvSpPr>
         <p:spPr>
           <a:xfrm>
-            <a:off x="1524000" y="3581400"/>
-            <a:ext cx="2590800" cy="533400"/>
+            <a:off x="1143000" y="5173133"/>
+            <a:ext cx="1943100" cy="770467"/>
           </a:xfrm>
           <a:prstGeom prst="rect">
             <a:avLst/>
@@ -4669,8 +4670,8 @@
         </p:nvCxnSpPr>
         <p:spPr>
           <a:xfrm flipV="1">
-            <a:off x="2819400" y="3200400"/>
-            <a:ext cx="0" cy="381000"/>
+            <a:off x="2114550" y="4622800"/>
+            <a:ext cx="0" cy="550333"/>
           </a:xfrm>
           <a:prstGeom prst="straightConnector1">
             <a:avLst/>
@@ -4706,8 +4707,8 @@
         </p:nvSpPr>
         <p:spPr>
           <a:xfrm>
-            <a:off x="4724400" y="838200"/>
-            <a:ext cx="2743200" cy="533400"/>
+            <a:off x="3543300" y="1210733"/>
+            <a:ext cx="2057400" cy="770467"/>
           </a:xfrm>
           <a:prstGeom prst="rect">
             <a:avLst/>
@@ -4760,8 +4761,8 @@
         </p:nvSpPr>
         <p:spPr>
           <a:xfrm>
-            <a:off x="4724400" y="5410200"/>
-            <a:ext cx="2590800" cy="533400"/>
+            <a:off x="3543300" y="7814733"/>
+            <a:ext cx="1943100" cy="770467"/>
           </a:xfrm>
           <a:prstGeom prst="rect">
             <a:avLst/>
@@ -4825,8 +4826,8 @@
         </p:nvCxnSpPr>
         <p:spPr>
           <a:xfrm flipV="1">
-            <a:off x="6019800" y="5029200"/>
-            <a:ext cx="0" cy="381000"/>
+            <a:off x="4514850" y="7264400"/>
+            <a:ext cx="0" cy="550333"/>
           </a:xfrm>
           <a:prstGeom prst="straightConnector1">
             <a:avLst/>

</xml_diff>